<commit_message>
added another bulletpoint to presentation
</commit_message>
<xml_diff>
--- a/documents/milestone2/Project Analysis Presentation.pptx
+++ b/documents/milestone2/Project Analysis Presentation.pptx
@@ -208,7 +208,7 @@
           <a:p>
             <a:fld id="{996702D7-FFC7-4541-8679-A800B838F073}" type="datetimeFigureOut">
               <a:rPr lang="en-US" smtClean="0"/>
-              <a:t>10/23/17</a:t>
+              <a:t>10/24/17</a:t>
             </a:fld>
             <a:endParaRPr lang="en-US"/>
           </a:p>
@@ -633,7 +633,7 @@
           <a:p>
             <a:fld id="{92B3D0C1-4C55-4174-ACB6-FE14EF983A6D}" type="datetimeFigureOut">
               <a:rPr lang="de-CH" smtClean="0"/>
-              <a:t>23.10.17</a:t>
+              <a:t>24.10.17</a:t>
             </a:fld>
             <a:endParaRPr lang="de-CH"/>
           </a:p>
@@ -861,7 +861,7 @@
           <a:p>
             <a:fld id="{92B3D0C1-4C55-4174-ACB6-FE14EF983A6D}" type="datetimeFigureOut">
               <a:rPr lang="de-CH" smtClean="0"/>
-              <a:t>23.10.17</a:t>
+              <a:t>24.10.17</a:t>
             </a:fld>
             <a:endParaRPr lang="de-CH"/>
           </a:p>
@@ -1041,7 +1041,7 @@
           <a:p>
             <a:fld id="{92B3D0C1-4C55-4174-ACB6-FE14EF983A6D}" type="datetimeFigureOut">
               <a:rPr lang="de-CH" smtClean="0"/>
-              <a:t>23.10.17</a:t>
+              <a:t>24.10.17</a:t>
             </a:fld>
             <a:endParaRPr lang="de-CH"/>
           </a:p>
@@ -1211,7 +1211,7 @@
           <a:p>
             <a:fld id="{92B3D0C1-4C55-4174-ACB6-FE14EF983A6D}" type="datetimeFigureOut">
               <a:rPr lang="de-CH" smtClean="0"/>
-              <a:t>23.10.17</a:t>
+              <a:t>24.10.17</a:t>
             </a:fld>
             <a:endParaRPr lang="de-CH"/>
           </a:p>
@@ -1465,7 +1465,7 @@
           <a:p>
             <a:fld id="{92B3D0C1-4C55-4174-ACB6-FE14EF983A6D}" type="datetimeFigureOut">
               <a:rPr lang="de-CH" smtClean="0"/>
-              <a:t>23.10.17</a:t>
+              <a:t>24.10.17</a:t>
             </a:fld>
             <a:endParaRPr lang="de-CH"/>
           </a:p>
@@ -1791,7 +1791,7 @@
           <a:p>
             <a:fld id="{92B3D0C1-4C55-4174-ACB6-FE14EF983A6D}" type="datetimeFigureOut">
               <a:rPr lang="de-CH" smtClean="0"/>
-              <a:t>23.10.17</a:t>
+              <a:t>24.10.17</a:t>
             </a:fld>
             <a:endParaRPr lang="de-CH"/>
           </a:p>
@@ -2242,7 +2242,7 @@
           <a:p>
             <a:fld id="{92B3D0C1-4C55-4174-ACB6-FE14EF983A6D}" type="datetimeFigureOut">
               <a:rPr lang="de-CH" smtClean="0"/>
-              <a:t>23.10.17</a:t>
+              <a:t>24.10.17</a:t>
             </a:fld>
             <a:endParaRPr lang="de-CH"/>
           </a:p>
@@ -2360,7 +2360,7 @@
           <a:p>
             <a:fld id="{92B3D0C1-4C55-4174-ACB6-FE14EF983A6D}" type="datetimeFigureOut">
               <a:rPr lang="de-CH" smtClean="0"/>
-              <a:t>23.10.17</a:t>
+              <a:t>24.10.17</a:t>
             </a:fld>
             <a:endParaRPr lang="de-CH"/>
           </a:p>
@@ -2455,7 +2455,7 @@
           <a:p>
             <a:fld id="{92B3D0C1-4C55-4174-ACB6-FE14EF983A6D}" type="datetimeFigureOut">
               <a:rPr lang="de-CH" smtClean="0"/>
-              <a:t>23.10.17</a:t>
+              <a:t>24.10.17</a:t>
             </a:fld>
             <a:endParaRPr lang="de-CH"/>
           </a:p>
@@ -2742,7 +2742,7 @@
           <a:p>
             <a:fld id="{92B3D0C1-4C55-4174-ACB6-FE14EF983A6D}" type="datetimeFigureOut">
               <a:rPr lang="de-CH" smtClean="0"/>
-              <a:t>23.10.17</a:t>
+              <a:t>24.10.17</a:t>
             </a:fld>
             <a:endParaRPr lang="de-CH"/>
           </a:p>
@@ -3067,7 +3067,7 @@
           <a:p>
             <a:fld id="{92B3D0C1-4C55-4174-ACB6-FE14EF983A6D}" type="datetimeFigureOut">
               <a:rPr lang="de-CH" smtClean="0"/>
-              <a:t>23.10.17</a:t>
+              <a:t>24.10.17</a:t>
             </a:fld>
             <a:endParaRPr lang="de-CH"/>
           </a:p>
@@ -3321,7 +3321,7 @@
           <a:p>
             <a:fld id="{92B3D0C1-4C55-4174-ACB6-FE14EF983A6D}" type="datetimeFigureOut">
               <a:rPr lang="de-CH" smtClean="0"/>
-              <a:t>23.10.17</a:t>
+              <a:t>24.10.17</a:t>
             </a:fld>
             <a:endParaRPr lang="de-CH"/>
           </a:p>
@@ -3814,7 +3814,7 @@
           <p:cNvPr id="5" name="Grafik 4">
             <a:extLst>
               <a:ext uri="{FF2B5EF4-FFF2-40B4-BE49-F238E27FC236}">
-                <a16:creationId xmlns="" xmlns:a16="http://schemas.microsoft.com/office/drawing/2014/main" id="{3CCF4D3B-7A0F-4753-9950-8C3AFE3346D9}"/>
+                <a16:creationId xmlns:a16="http://schemas.microsoft.com/office/drawing/2014/main" xmlns="" id="{3CCF4D3B-7A0F-4753-9950-8C3AFE3346D9}"/>
               </a:ext>
             </a:extLst>
           </p:cNvPr>
@@ -4011,14 +4011,26 @@
         </p:spPr>
         <p:txBody>
           <a:bodyPr>
-            <a:normAutofit/>
+            <a:normAutofit fontScale="92500" lnSpcReduction="10000"/>
           </a:bodyPr>
           <a:lstStyle/>
           <a:p>
             <a:r>
               <a:rPr lang="en-US" dirty="0" smtClean="0"/>
-              <a:t>Current iteration #2 will end on Friday</a:t>
-            </a:r>
+              <a:t>Current iteration #2 will end on </a:t>
+            </a:r>
+            <a:r>
+              <a:rPr lang="en-US" dirty="0" smtClean="0"/>
+              <a:t>Friday</a:t>
+            </a:r>
+          </a:p>
+          <a:p>
+            <a:pPr lvl="1"/>
+            <a:r>
+              <a:rPr lang="en-US" dirty="0" smtClean="0"/>
+              <a:t>Detailed UC defined, Domain Model created and Project Analysis</a:t>
+            </a:r>
+            <a:endParaRPr lang="en-US" dirty="0" smtClean="0"/>
           </a:p>
           <a:p>
             <a:r>
@@ -4263,15 +4275,33 @@
                                   </p:childTnLst>
                                 </p:cTn>
                               </p:par>
+                            </p:childTnLst>
+                          </p:cTn>
+                        </p:par>
+                      </p:childTnLst>
+                    </p:cTn>
+                  </p:par>
+                  <p:par>
+                    <p:cTn id="19" fill="hold">
+                      <p:stCondLst>
+                        <p:cond delay="indefinite"/>
+                      </p:stCondLst>
+                      <p:childTnLst>
+                        <p:par>
+                          <p:cTn id="20" fill="hold">
+                            <p:stCondLst>
+                              <p:cond delay="0"/>
+                            </p:stCondLst>
+                            <p:childTnLst>
                               <p:par>
-                                <p:cTn id="19" presetID="1" presetClass="entr" presetSubtype="0" fill="hold" nodeType="withEffect">
+                                <p:cTn id="21" presetID="1" presetClass="entr" presetSubtype="0" fill="hold" nodeType="clickEffect">
                                   <p:stCondLst>
                                     <p:cond delay="0"/>
                                   </p:stCondLst>
                                   <p:childTnLst>
                                     <p:set>
                                       <p:cBhvr>
-                                        <p:cTn id="20" dur="1" fill="hold">
+                                        <p:cTn id="22" dur="1" fill="hold">
                                           <p:stCondLst>
                                             <p:cond delay="0"/>
                                           </p:stCondLst>
@@ -4295,14 +4325,14 @@
                                 </p:cTn>
                               </p:par>
                               <p:par>
-                                <p:cTn id="21" presetID="1" presetClass="entr" presetSubtype="0" fill="hold" nodeType="withEffect">
+                                <p:cTn id="23" presetID="1" presetClass="entr" presetSubtype="0" fill="hold" nodeType="withEffect">
                                   <p:stCondLst>
                                     <p:cond delay="0"/>
                                   </p:stCondLst>
                                   <p:childTnLst>
                                     <p:set>
                                       <p:cBhvr>
-                                        <p:cTn id="22" dur="1" fill="hold">
+                                        <p:cTn id="24" dur="1" fill="hold">
                                           <p:stCondLst>
                                             <p:cond delay="0"/>
                                           </p:stCondLst>
@@ -4311,6 +4341,37 @@
                                           <p:spTgt spid="3">
                                             <p:txEl>
                                               <p:pRg st="5" end="5"/>
+                                            </p:txEl>
+                                          </p:spTgt>
+                                        </p:tgtEl>
+                                        <p:attrNameLst>
+                                          <p:attrName>style.visibility</p:attrName>
+                                        </p:attrNameLst>
+                                      </p:cBhvr>
+                                      <p:to>
+                                        <p:strVal val="visible"/>
+                                      </p:to>
+                                    </p:set>
+                                  </p:childTnLst>
+                                </p:cTn>
+                              </p:par>
+                              <p:par>
+                                <p:cTn id="25" presetID="1" presetClass="entr" presetSubtype="0" fill="hold" nodeType="withEffect">
+                                  <p:stCondLst>
+                                    <p:cond delay="0"/>
+                                  </p:stCondLst>
+                                  <p:childTnLst>
+                                    <p:set>
+                                      <p:cBhvr>
+                                        <p:cTn id="26" dur="1" fill="hold">
+                                          <p:stCondLst>
+                                            <p:cond delay="0"/>
+                                          </p:stCondLst>
+                                        </p:cTn>
+                                        <p:tgtEl>
+                                          <p:spTgt spid="3">
+                                            <p:txEl>
+                                              <p:pRg st="6" end="6"/>
                                             </p:txEl>
                                           </p:spTgt>
                                         </p:tgtEl>
@@ -6580,7 +6641,7 @@
           <p:cNvPr id="8" name="Grafik 7">
             <a:extLst>
               <a:ext uri="{FF2B5EF4-FFF2-40B4-BE49-F238E27FC236}">
-                <a16:creationId xmlns="" xmlns:a16="http://schemas.microsoft.com/office/drawing/2014/main" id="{FEADF4F9-87B1-447B-A6E7-8A6D9620218C}"/>
+                <a16:creationId xmlns:a16="http://schemas.microsoft.com/office/drawing/2014/main" xmlns="" id="{FEADF4F9-87B1-447B-A6E7-8A6D9620218C}"/>
               </a:ext>
             </a:extLst>
           </p:cNvPr>
@@ -6685,7 +6746,7 @@
           <p:cNvPr id="8" name="Grafik 7">
             <a:extLst>
               <a:ext uri="{FF2B5EF4-FFF2-40B4-BE49-F238E27FC236}">
-                <a16:creationId xmlns="" xmlns:a16="http://schemas.microsoft.com/office/drawing/2014/main" id="{FEADF4F9-87B1-447B-A6E7-8A6D9620218C}"/>
+                <a16:creationId xmlns:a16="http://schemas.microsoft.com/office/drawing/2014/main" xmlns="" id="{FEADF4F9-87B1-447B-A6E7-8A6D9620218C}"/>
               </a:ext>
             </a:extLst>
           </p:cNvPr>

</xml_diff>

<commit_message>
increased size of domain model diagram in presentation
</commit_message>
<xml_diff>
--- a/documents/milestone2/Project Analysis Presentation.pptx
+++ b/documents/milestone2/Project Analysis Presentation.pptx
@@ -3814,7 +3814,7 @@
           <p:cNvPr id="5" name="Grafik 4">
             <a:extLst>
               <a:ext uri="{FF2B5EF4-FFF2-40B4-BE49-F238E27FC236}">
-                <a16:creationId xmlns:a16="http://schemas.microsoft.com/office/drawing/2014/main" xmlns="" id="{3CCF4D3B-7A0F-4753-9950-8C3AFE3346D9}"/>
+                <a16:creationId xmlns="" xmlns:a16="http://schemas.microsoft.com/office/drawing/2014/main" id="{3CCF4D3B-7A0F-4753-9950-8C3AFE3346D9}"/>
               </a:ext>
             </a:extLst>
           </p:cNvPr>
@@ -4017,11 +4017,7 @@
           <a:p>
             <a:r>
               <a:rPr lang="en-US" dirty="0" smtClean="0"/>
-              <a:t>Current iteration #2 will end on </a:t>
-            </a:r>
-            <a:r>
-              <a:rPr lang="en-US" dirty="0" smtClean="0"/>
-              <a:t>Friday</a:t>
+              <a:t>Current iteration #2 will end on Friday</a:t>
             </a:r>
           </a:p>
           <a:p>
@@ -4030,7 +4026,6 @@
               <a:rPr lang="en-US" dirty="0" smtClean="0"/>
               <a:t>Detailed UC defined, Domain Model created and Project Analysis</a:t>
             </a:r>
-            <a:endParaRPr lang="en-US" dirty="0" smtClean="0"/>
           </a:p>
           <a:p>
             <a:r>
@@ -5167,8 +5162,8 @@
         </p:blipFill>
         <p:spPr bwMode="auto">
           <a:xfrm>
-            <a:off x="5065712" y="1028541"/>
-            <a:ext cx="5718175" cy="5324475"/>
+            <a:off x="4932009" y="0"/>
+            <a:ext cx="7365091" cy="6858000"/>
           </a:xfrm>
           <a:prstGeom prst="rect">
             <a:avLst/>
@@ -6641,7 +6636,7 @@
           <p:cNvPr id="8" name="Grafik 7">
             <a:extLst>
               <a:ext uri="{FF2B5EF4-FFF2-40B4-BE49-F238E27FC236}">
-                <a16:creationId xmlns:a16="http://schemas.microsoft.com/office/drawing/2014/main" xmlns="" id="{FEADF4F9-87B1-447B-A6E7-8A6D9620218C}"/>
+                <a16:creationId xmlns="" xmlns:a16="http://schemas.microsoft.com/office/drawing/2014/main" id="{FEADF4F9-87B1-447B-A6E7-8A6D9620218C}"/>
               </a:ext>
             </a:extLst>
           </p:cNvPr>
@@ -6746,7 +6741,7 @@
           <p:cNvPr id="8" name="Grafik 7">
             <a:extLst>
               <a:ext uri="{FF2B5EF4-FFF2-40B4-BE49-F238E27FC236}">
-                <a16:creationId xmlns:a16="http://schemas.microsoft.com/office/drawing/2014/main" xmlns="" id="{FEADF4F9-87B1-447B-A6E7-8A6D9620218C}"/>
+                <a16:creationId xmlns="" xmlns:a16="http://schemas.microsoft.com/office/drawing/2014/main" id="{FEADF4F9-87B1-447B-A6E7-8A6D9620218C}"/>
               </a:ext>
             </a:extLst>
           </p:cNvPr>

</xml_diff>